<commit_message>
power point e relazione corretti con la nuova foto
</commit_message>
<xml_diff>
--- a/SeiAppPP.pptx
+++ b/SeiAppPP.pptx
@@ -2,7 +2,7 @@
 <file path=ppt/presentation.xml><?xml version="1.0" encoding="utf-8"?>
 <p:presentation xmlns:a="http://schemas.openxmlformats.org/drawingml/2006/main" xmlns:r="http://schemas.openxmlformats.org/officeDocument/2006/relationships" xmlns:p="http://schemas.openxmlformats.org/presentationml/2006/main" saveSubsetFonts="1">
   <p:sldMasterIdLst>
-    <p:sldMasterId id="2147483690" r:id="rId1"/>
+    <p:sldMasterId id="2147483708" r:id="rId1"/>
   </p:sldMasterIdLst>
   <p:sldIdLst>
     <p:sldId id="256" r:id="rId2"/>
@@ -187,8 +187,8 @@
           </a:lstStyle>
           <a:p>
             <a:r>
-              <a:rPr lang="it-IT"/>
-              <a:t>Fare clic per modificare lo stile del titolo dello schema</a:t>
+              <a:rPr lang="it-IT" smtClean="0"/>
+              <a:t>Fare clic per modificare lo stile del titolo</a:t>
             </a:r>
             <a:endParaRPr lang="en-US" dirty="0"/>
           </a:p>
@@ -217,10 +217,7 @@
               <a:buNone/>
               <a:defRPr cap="all">
                 <a:solidFill>
-                  <a:schemeClr val="bg2">
-                    <a:lumMod val="40000"/>
-                    <a:lumOff val="60000"/>
-                  </a:schemeClr>
+                  <a:schemeClr val="accent1"/>
                 </a:solidFill>
               </a:defRPr>
             </a:lvl1pPr>
@@ -307,7 +304,7 @@
           </a:lstStyle>
           <a:p>
             <a:r>
-              <a:rPr lang="it-IT"/>
+              <a:rPr lang="it-IT" smtClean="0"/>
               <a:t>Fare clic per modificare lo stile del sottotitolo dello schema</a:t>
             </a:r>
             <a:endParaRPr lang="en-US" dirty="0"/>
@@ -331,7 +328,7 @@
           <a:p>
             <a:fld id="{D531FE41-B64C-455A-91F0-E108D3BD53E9}" type="datetimeFigureOut">
               <a:rPr lang="it-IT" smtClean="0"/>
-              <a:t>04/09/2020</a:t>
+              <a:t>07/09/2020</a:t>
             </a:fld>
             <a:endParaRPr lang="it-IT"/>
           </a:p>
@@ -382,7 +379,7 @@
     </p:spTree>
     <p:extLst>
       <p:ext uri="{BB962C8B-B14F-4D97-AF65-F5344CB8AC3E}">
-        <p14:creationId xmlns:p14="http://schemas.microsoft.com/office/powerpoint/2010/main" val="4088442179"/>
+        <p14:creationId xmlns:p14="http://schemas.microsoft.com/office/powerpoint/2010/main" val="2651218487"/>
       </p:ext>
     </p:extLst>
   </p:cSld>
@@ -436,8 +433,8 @@
           </a:lstStyle>
           <a:p>
             <a:r>
-              <a:rPr lang="it-IT"/>
-              <a:t>Fare clic per modificare lo stile del titolo dello schema</a:t>
+              <a:rPr lang="it-IT" smtClean="0"/>
+              <a:t>Fare clic per modificare lo stile del titolo</a:t>
             </a:r>
             <a:endParaRPr lang="en-US" dirty="0"/>
           </a:p>
@@ -515,7 +512,7 @@
           </a:lstStyle>
           <a:p>
             <a:r>
-              <a:rPr lang="it-IT"/>
+              <a:rPr lang="it-IT" smtClean="0"/>
               <a:t>Fare clic sull'icona per inserire un'immagine</a:t>
             </a:r>
             <a:endParaRPr lang="en-US" dirty="0"/>
@@ -583,7 +580,7 @@
           <a:p>
             <a:pPr lvl="0"/>
             <a:r>
-              <a:rPr lang="it-IT"/>
+              <a:rPr lang="it-IT" smtClean="0"/>
               <a:t>Modifica gli stili del testo dello schema</a:t>
             </a:r>
           </a:p>
@@ -606,7 +603,7 @@
           <a:p>
             <a:fld id="{D531FE41-B64C-455A-91F0-E108D3BD53E9}" type="datetimeFigureOut">
               <a:rPr lang="it-IT" smtClean="0"/>
-              <a:t>04/09/2020</a:t>
+              <a:t>07/09/2020</a:t>
             </a:fld>
             <a:endParaRPr lang="it-IT"/>
           </a:p>
@@ -657,7 +654,7 @@
     </p:spTree>
     <p:extLst>
       <p:ext uri="{BB962C8B-B14F-4D97-AF65-F5344CB8AC3E}">
-        <p14:creationId xmlns:p14="http://schemas.microsoft.com/office/powerpoint/2010/main" val="724933119"/>
+        <p14:creationId xmlns:p14="http://schemas.microsoft.com/office/powerpoint/2010/main" val="4258500081"/>
       </p:ext>
     </p:extLst>
   </p:cSld>
@@ -709,8 +706,8 @@
           </a:lstStyle>
           <a:p>
             <a:r>
-              <a:rPr lang="it-IT"/>
-              <a:t>Fare clic per modificare lo stile del titolo dello schema</a:t>
+              <a:rPr lang="it-IT" smtClean="0"/>
+              <a:t>Fare clic per modificare lo stile del titolo</a:t>
             </a:r>
             <a:endParaRPr lang="en-US" dirty="0"/>
           </a:p>
@@ -777,7 +774,7 @@
           <a:p>
             <a:pPr lvl="0"/>
             <a:r>
-              <a:rPr lang="it-IT"/>
+              <a:rPr lang="it-IT" smtClean="0"/>
               <a:t>Modifica gli stili del testo dello schema</a:t>
             </a:r>
           </a:p>
@@ -800,7 +797,7 @@
           <a:p>
             <a:fld id="{D531FE41-B64C-455A-91F0-E108D3BD53E9}" type="datetimeFigureOut">
               <a:rPr lang="it-IT" smtClean="0"/>
-              <a:t>04/09/2020</a:t>
+              <a:t>07/09/2020</a:t>
             </a:fld>
             <a:endParaRPr lang="it-IT"/>
           </a:p>
@@ -851,7 +848,7 @@
     </p:spTree>
     <p:extLst>
       <p:ext uri="{BB962C8B-B14F-4D97-AF65-F5344CB8AC3E}">
-        <p14:creationId xmlns:p14="http://schemas.microsoft.com/office/powerpoint/2010/main" val="3344586711"/>
+        <p14:creationId xmlns:p14="http://schemas.microsoft.com/office/powerpoint/2010/main" val="918340980"/>
       </p:ext>
     </p:extLst>
   </p:cSld>
@@ -903,8 +900,8 @@
           </a:lstStyle>
           <a:p>
             <a:r>
-              <a:rPr lang="it-IT"/>
-              <a:t>Fare clic per modificare lo stile del titolo dello schema</a:t>
+              <a:rPr lang="it-IT" smtClean="0"/>
+              <a:t>Fare clic per modificare lo stile del titolo</a:t>
             </a:r>
             <a:endParaRPr lang="en-US" dirty="0"/>
           </a:p>
@@ -912,12 +909,12 @@
       </p:sp>
       <p:sp>
         <p:nvSpPr>
-          <p:cNvPr id="11" name="Text Placeholder 3"/>
-          <p:cNvSpPr>
-            <a:spLocks noGrp="1"/>
-          </p:cNvSpPr>
-          <p:nvPr>
-            <p:ph type="body" sz="half" idx="14"/>
+          <p:cNvPr id="14" name="Text Placeholder 3"/>
+          <p:cNvSpPr>
+            <a:spLocks noGrp="1"/>
+          </p:cNvSpPr>
+          <p:nvPr>
+            <p:ph type="body" sz="half" idx="13"/>
           </p:nvPr>
         </p:nvSpPr>
         <p:spPr>
@@ -927,7 +924,7 @@
           </a:xfrm>
         </p:spPr>
         <p:txBody>
-          <a:bodyPr vert="horz" lIns="91440" tIns="45720" rIns="91440" bIns="45720" rtlCol="0" anchor="t">
+          <a:bodyPr anchor="t">
             <a:normAutofit/>
           </a:bodyPr>
           <a:lstStyle>
@@ -935,10 +932,7 @@
               <a:buNone/>
               <a:defRPr lang="en-US" sz="1400" b="0" i="0" kern="1200" cap="small" dirty="0">
                 <a:solidFill>
-                  <a:schemeClr val="bg2">
-                    <a:lumMod val="40000"/>
-                    <a:lumOff val="60000"/>
-                  </a:schemeClr>
+                  <a:schemeClr val="accent1"/>
                 </a:solidFill>
                 <a:latin typeface="+mj-lt"/>
                 <a:ea typeface="+mj-ea"/>
@@ -979,11 +973,9 @@
             </a:lvl9pPr>
           </a:lstStyle>
           <a:p>
-            <a:pPr marL="0" lvl="0" indent="0">
-              <a:buNone/>
-            </a:pPr>
-            <a:r>
-              <a:rPr lang="it-IT"/>
+            <a:pPr lvl="0"/>
+            <a:r>
+              <a:rPr lang="it-IT" smtClean="0"/>
               <a:t>Modifica gli stili del testo dello schema</a:t>
             </a:r>
           </a:p>
@@ -1050,7 +1042,7 @@
           <a:p>
             <a:pPr lvl="0"/>
             <a:r>
-              <a:rPr lang="it-IT"/>
+              <a:rPr lang="it-IT" smtClean="0"/>
               <a:t>Modifica gli stili del testo dello schema</a:t>
             </a:r>
           </a:p>
@@ -1073,7 +1065,7 @@
           <a:p>
             <a:fld id="{D531FE41-B64C-455A-91F0-E108D3BD53E9}" type="datetimeFigureOut">
               <a:rPr lang="it-IT" smtClean="0"/>
-              <a:t>04/09/2020</a:t>
+              <a:t>07/09/2020</a:t>
             </a:fld>
             <a:endParaRPr lang="it-IT"/>
           </a:p>
@@ -1123,7 +1115,7 @@
       </p:sp>
       <p:sp>
         <p:nvSpPr>
-          <p:cNvPr id="12" name="TextBox 11"/>
+          <p:cNvPr id="9" name="TextBox 8"/>
           <p:cNvSpPr txBox="1"/>
           <p:nvPr/>
         </p:nvSpPr>
@@ -1148,10 +1140,7 @@
             <a:lvl1pPr algn="r">
               <a:defRPr sz="12200" b="0" i="0">
                 <a:solidFill>
-                  <a:schemeClr val="bg2">
-                    <a:lumMod val="40000"/>
-                    <a:lumOff val="60000"/>
-                  </a:schemeClr>
+                  <a:schemeClr val="accent1"/>
                 </a:solidFill>
                 <a:latin typeface="Arial"/>
                 <a:ea typeface="+mj-ea"/>
@@ -1170,7 +1159,7 @@
       </p:sp>
       <p:sp>
         <p:nvSpPr>
-          <p:cNvPr id="15" name="TextBox 14"/>
+          <p:cNvPr id="13" name="TextBox 12"/>
           <p:cNvSpPr txBox="1"/>
           <p:nvPr/>
         </p:nvSpPr>
@@ -1195,10 +1184,7 @@
             <a:lvl1pPr algn="r">
               <a:defRPr sz="12200" b="0" i="0">
                 <a:solidFill>
-                  <a:schemeClr val="bg2">
-                    <a:lumMod val="40000"/>
-                    <a:lumOff val="60000"/>
-                  </a:schemeClr>
+                  <a:schemeClr val="accent1"/>
                 </a:solidFill>
                 <a:latin typeface="Arial"/>
                 <a:ea typeface="+mj-ea"/>
@@ -1218,7 +1204,7 @@
     </p:spTree>
     <p:extLst>
       <p:ext uri="{BB962C8B-B14F-4D97-AF65-F5344CB8AC3E}">
-        <p14:creationId xmlns:p14="http://schemas.microsoft.com/office/powerpoint/2010/main" val="1797463328"/>
+        <p14:creationId xmlns:p14="http://schemas.microsoft.com/office/powerpoint/2010/main" val="763694836"/>
       </p:ext>
     </p:extLst>
   </p:cSld>
@@ -1270,8 +1256,8 @@
           </a:lstStyle>
           <a:p>
             <a:r>
-              <a:rPr lang="it-IT"/>
-              <a:t>Fare clic per modificare lo stile del titolo dello schema</a:t>
+              <a:rPr lang="it-IT" smtClean="0"/>
+              <a:t>Fare clic per modificare lo stile del titolo</a:t>
             </a:r>
             <a:endParaRPr lang="en-US" dirty="0"/>
           </a:p>
@@ -1300,10 +1286,7 @@
               <a:buNone/>
               <a:defRPr sz="2000" cap="none">
                 <a:solidFill>
-                  <a:schemeClr val="bg2">
-                    <a:lumMod val="40000"/>
-                    <a:lumOff val="60000"/>
-                  </a:schemeClr>
+                  <a:schemeClr val="accent1"/>
                 </a:solidFill>
               </a:defRPr>
             </a:lvl1pPr>
@@ -1391,7 +1374,7 @@
           <a:p>
             <a:pPr lvl="0"/>
             <a:r>
-              <a:rPr lang="it-IT"/>
+              <a:rPr lang="it-IT" smtClean="0"/>
               <a:t>Modifica gli stili del testo dello schema</a:t>
             </a:r>
           </a:p>
@@ -1414,7 +1397,7 @@
           <a:p>
             <a:fld id="{D531FE41-B64C-455A-91F0-E108D3BD53E9}" type="datetimeFigureOut">
               <a:rPr lang="it-IT" smtClean="0"/>
-              <a:t>04/09/2020</a:t>
+              <a:t>07/09/2020</a:t>
             </a:fld>
             <a:endParaRPr lang="it-IT"/>
           </a:p>
@@ -1465,7 +1448,7 @@
     </p:spTree>
     <p:extLst>
       <p:ext uri="{BB962C8B-B14F-4D97-AF65-F5344CB8AC3E}">
-        <p14:creationId xmlns:p14="http://schemas.microsoft.com/office/powerpoint/2010/main" val="1538313492"/>
+        <p14:creationId xmlns:p14="http://schemas.microsoft.com/office/powerpoint/2010/main" val="654624802"/>
       </p:ext>
     </p:extLst>
   </p:cSld>
@@ -1512,8 +1495,8 @@
           </a:lstStyle>
           <a:p>
             <a:r>
-              <a:rPr lang="it-IT"/>
-              <a:t>Fare clic per modificare lo stile del titolo dello schema</a:t>
+              <a:rPr lang="it-IT" smtClean="0"/>
+              <a:t>Fare clic per modificare lo stile del titolo</a:t>
             </a:r>
             <a:endParaRPr lang="en-US" dirty="0"/>
           </a:p>
@@ -1544,10 +1527,7 @@
               <a:buNone/>
               <a:defRPr sz="2400" b="0">
                 <a:solidFill>
-                  <a:schemeClr val="bg2">
-                    <a:lumMod val="40000"/>
-                    <a:lumOff val="60000"/>
-                  </a:schemeClr>
+                  <a:schemeClr val="accent1"/>
                 </a:solidFill>
               </a:defRPr>
             </a:lvl1pPr>
@@ -1587,7 +1567,7 @@
           <a:p>
             <a:pPr lvl="0"/>
             <a:r>
-              <a:rPr lang="it-IT"/>
+              <a:rPr lang="it-IT" smtClean="0"/>
               <a:t>Modifica gli stili del testo dello schema</a:t>
             </a:r>
           </a:p>
@@ -1654,7 +1634,7 @@
           <a:p>
             <a:pPr lvl="0"/>
             <a:r>
-              <a:rPr lang="it-IT"/>
+              <a:rPr lang="it-IT" smtClean="0"/>
               <a:t>Modifica gli stili del testo dello schema</a:t>
             </a:r>
           </a:p>
@@ -1685,10 +1665,7 @@
               <a:buNone/>
               <a:defRPr sz="2400" b="0">
                 <a:solidFill>
-                  <a:schemeClr val="bg2">
-                    <a:lumMod val="40000"/>
-                    <a:lumOff val="60000"/>
-                  </a:schemeClr>
+                  <a:schemeClr val="accent1"/>
                 </a:solidFill>
               </a:defRPr>
             </a:lvl1pPr>
@@ -1728,7 +1705,7 @@
           <a:p>
             <a:pPr lvl="0"/>
             <a:r>
-              <a:rPr lang="it-IT"/>
+              <a:rPr lang="it-IT" smtClean="0"/>
               <a:t>Modifica gli stili del testo dello schema</a:t>
             </a:r>
           </a:p>
@@ -1795,7 +1772,7 @@
           <a:p>
             <a:pPr lvl="0"/>
             <a:r>
-              <a:rPr lang="it-IT"/>
+              <a:rPr lang="it-IT" smtClean="0"/>
               <a:t>Modifica gli stili del testo dello schema</a:t>
             </a:r>
           </a:p>
@@ -1826,10 +1803,7 @@
               <a:buNone/>
               <a:defRPr sz="2400" b="0">
                 <a:solidFill>
-                  <a:schemeClr val="bg2">
-                    <a:lumMod val="40000"/>
-                    <a:lumOff val="60000"/>
-                  </a:schemeClr>
+                  <a:schemeClr val="accent1"/>
                 </a:solidFill>
               </a:defRPr>
             </a:lvl1pPr>
@@ -1869,7 +1843,7 @@
           <a:p>
             <a:pPr lvl="0"/>
             <a:r>
-              <a:rPr lang="it-IT"/>
+              <a:rPr lang="it-IT" smtClean="0"/>
               <a:t>Modifica gli stili del testo dello schema</a:t>
             </a:r>
           </a:p>
@@ -1936,7 +1910,7 @@
           <a:p>
             <a:pPr lvl="0"/>
             <a:r>
-              <a:rPr lang="it-IT"/>
+              <a:rPr lang="it-IT" smtClean="0"/>
               <a:t>Modifica gli stili del testo dello schema</a:t>
             </a:r>
           </a:p>
@@ -1958,9 +1932,7 @@
           </a:prstGeom>
           <a:ln w="12700" cmpd="sng">
             <a:solidFill>
-              <a:schemeClr val="bg2">
-                <a:lumMod val="40000"/>
-                <a:lumOff val="60000"/>
+              <a:schemeClr val="accent1">
                 <a:alpha val="40000"/>
               </a:schemeClr>
             </a:solidFill>
@@ -1997,9 +1969,7 @@
           </a:prstGeom>
           <a:ln w="12700" cmpd="sng">
             <a:solidFill>
-              <a:schemeClr val="bg2">
-                <a:lumMod val="40000"/>
-                <a:lumOff val="60000"/>
+              <a:schemeClr val="accent1">
                 <a:alpha val="40000"/>
               </a:schemeClr>
             </a:solidFill>
@@ -2037,7 +2007,7 @@
           <a:p>
             <a:fld id="{D531FE41-B64C-455A-91F0-E108D3BD53E9}" type="datetimeFigureOut">
               <a:rPr lang="it-IT" smtClean="0"/>
-              <a:t>04/09/2020</a:t>
+              <a:t>07/09/2020</a:t>
             </a:fld>
             <a:endParaRPr lang="it-IT"/>
           </a:p>
@@ -2088,7 +2058,7 @@
     </p:spTree>
     <p:extLst>
       <p:ext uri="{BB962C8B-B14F-4D97-AF65-F5344CB8AC3E}">
-        <p14:creationId xmlns:p14="http://schemas.microsoft.com/office/powerpoint/2010/main" val="3037405934"/>
+        <p14:creationId xmlns:p14="http://schemas.microsoft.com/office/powerpoint/2010/main" val="2886513559"/>
       </p:ext>
     </p:extLst>
   </p:cSld>
@@ -2135,8 +2105,8 @@
           </a:lstStyle>
           <a:p>
             <a:r>
-              <a:rPr lang="it-IT"/>
-              <a:t>Fare clic per modificare lo stile del titolo dello schema</a:t>
+              <a:rPr lang="it-IT" smtClean="0"/>
+              <a:t>Fare clic per modificare lo stile del titolo</a:t>
             </a:r>
             <a:endParaRPr lang="en-US" dirty="0"/>
           </a:p>
@@ -2167,10 +2137,7 @@
               <a:buNone/>
               <a:defRPr sz="2400" b="0">
                 <a:solidFill>
-                  <a:schemeClr val="bg2">
-                    <a:lumMod val="40000"/>
-                    <a:lumOff val="60000"/>
-                  </a:schemeClr>
+                  <a:schemeClr val="accent1"/>
                 </a:solidFill>
               </a:defRPr>
             </a:lvl1pPr>
@@ -2210,7 +2177,7 @@
           <a:p>
             <a:pPr lvl="0"/>
             <a:r>
-              <a:rPr lang="it-IT"/>
+              <a:rPr lang="it-IT" smtClean="0"/>
               <a:t>Modifica gli stili del testo dello schema</a:t>
             </a:r>
           </a:p>
@@ -2288,7 +2255,7 @@
           </a:lstStyle>
           <a:p>
             <a:r>
-              <a:rPr lang="it-IT"/>
+              <a:rPr lang="it-IT" smtClean="0"/>
               <a:t>Fare clic sull'icona per inserire un'immagine</a:t>
             </a:r>
             <a:endParaRPr lang="en-US" dirty="0"/>
@@ -2356,7 +2323,7 @@
           <a:p>
             <a:pPr lvl="0"/>
             <a:r>
-              <a:rPr lang="it-IT"/>
+              <a:rPr lang="it-IT" smtClean="0"/>
               <a:t>Modifica gli stili del testo dello schema</a:t>
             </a:r>
           </a:p>
@@ -2387,10 +2354,7 @@
               <a:buNone/>
               <a:defRPr sz="2400" b="0">
                 <a:solidFill>
-                  <a:schemeClr val="bg2">
-                    <a:lumMod val="40000"/>
-                    <a:lumOff val="60000"/>
-                  </a:schemeClr>
+                  <a:schemeClr val="accent1"/>
                 </a:solidFill>
               </a:defRPr>
             </a:lvl1pPr>
@@ -2430,7 +2394,7 @@
           <a:p>
             <a:pPr lvl="0"/>
             <a:r>
-              <a:rPr lang="it-IT"/>
+              <a:rPr lang="it-IT" smtClean="0"/>
               <a:t>Modifica gli stili del testo dello schema</a:t>
             </a:r>
           </a:p>
@@ -2508,7 +2472,7 @@
           </a:lstStyle>
           <a:p>
             <a:r>
-              <a:rPr lang="it-IT"/>
+              <a:rPr lang="it-IT" smtClean="0"/>
               <a:t>Fare clic sull'icona per inserire un'immagine</a:t>
             </a:r>
             <a:endParaRPr lang="en-US" dirty="0"/>
@@ -2576,7 +2540,7 @@
           <a:p>
             <a:pPr lvl="0"/>
             <a:r>
-              <a:rPr lang="it-IT"/>
+              <a:rPr lang="it-IT" smtClean="0"/>
               <a:t>Modifica gli stili del testo dello schema</a:t>
             </a:r>
           </a:p>
@@ -2607,10 +2571,7 @@
               <a:buNone/>
               <a:defRPr sz="2400" b="0">
                 <a:solidFill>
-                  <a:schemeClr val="bg2">
-                    <a:lumMod val="40000"/>
-                    <a:lumOff val="60000"/>
-                  </a:schemeClr>
+                  <a:schemeClr val="accent1"/>
                 </a:solidFill>
               </a:defRPr>
             </a:lvl1pPr>
@@ -2650,7 +2611,7 @@
           <a:p>
             <a:pPr lvl="0"/>
             <a:r>
-              <a:rPr lang="it-IT"/>
+              <a:rPr lang="it-IT" smtClean="0"/>
               <a:t>Modifica gli stili del testo dello schema</a:t>
             </a:r>
           </a:p>
@@ -2728,7 +2689,7 @@
           </a:lstStyle>
           <a:p>
             <a:r>
-              <a:rPr lang="it-IT"/>
+              <a:rPr lang="it-IT" smtClean="0"/>
               <a:t>Fare clic sull'icona per inserire un'immagine</a:t>
             </a:r>
             <a:endParaRPr lang="en-US" dirty="0"/>
@@ -2796,7 +2757,7 @@
           <a:p>
             <a:pPr lvl="0"/>
             <a:r>
-              <a:rPr lang="it-IT"/>
+              <a:rPr lang="it-IT" smtClean="0"/>
               <a:t>Modifica gli stili del testo dello schema</a:t>
             </a:r>
           </a:p>
@@ -2804,7 +2765,7 @@
       </p:sp>
       <p:cxnSp>
         <p:nvCxnSpPr>
-          <p:cNvPr id="19" name="Straight Connector 18"/>
+          <p:cNvPr id="17" name="Straight Connector 16"/>
           <p:cNvCxnSpPr/>
           <p:nvPr/>
         </p:nvCxnSpPr>
@@ -2818,9 +2779,7 @@
           </a:prstGeom>
           <a:ln w="12700" cmpd="sng">
             <a:solidFill>
-              <a:schemeClr val="bg2">
-                <a:lumMod val="40000"/>
-                <a:lumOff val="60000"/>
+              <a:schemeClr val="accent1">
                 <a:alpha val="40000"/>
               </a:schemeClr>
             </a:solidFill>
@@ -2843,7 +2802,7 @@
       </p:cxnSp>
       <p:cxnSp>
         <p:nvCxnSpPr>
-          <p:cNvPr id="20" name="Straight Connector 19"/>
+          <p:cNvPr id="18" name="Straight Connector 17"/>
           <p:cNvCxnSpPr/>
           <p:nvPr/>
         </p:nvCxnSpPr>
@@ -2857,9 +2816,7 @@
           </a:prstGeom>
           <a:ln w="12700" cmpd="sng">
             <a:solidFill>
-              <a:schemeClr val="bg2">
-                <a:lumMod val="40000"/>
-                <a:lumOff val="60000"/>
+              <a:schemeClr val="accent1">
                 <a:alpha val="40000"/>
               </a:schemeClr>
             </a:solidFill>
@@ -2897,7 +2854,7 @@
           <a:p>
             <a:fld id="{D531FE41-B64C-455A-91F0-E108D3BD53E9}" type="datetimeFigureOut">
               <a:rPr lang="it-IT" smtClean="0"/>
-              <a:t>04/09/2020</a:t>
+              <a:t>07/09/2020</a:t>
             </a:fld>
             <a:endParaRPr lang="it-IT"/>
           </a:p>
@@ -2948,7 +2905,7 @@
     </p:spTree>
     <p:extLst>
       <p:ext uri="{BB962C8B-B14F-4D97-AF65-F5344CB8AC3E}">
-        <p14:creationId xmlns:p14="http://schemas.microsoft.com/office/powerpoint/2010/main" val="1607573991"/>
+        <p14:creationId xmlns:p14="http://schemas.microsoft.com/office/powerpoint/2010/main" val="3748232827"/>
       </p:ext>
     </p:extLst>
   </p:cSld>
@@ -2991,8 +2948,8 @@
           <a:lstStyle/>
           <a:p>
             <a:r>
-              <a:rPr lang="it-IT"/>
-              <a:t>Fare clic per modificare lo stile del titolo dello schema</a:t>
+              <a:rPr lang="it-IT" smtClean="0"/>
+              <a:t>Fare clic per modificare lo stile del titolo</a:t>
             </a:r>
             <a:endParaRPr lang="en-US" dirty="0"/>
           </a:p>
@@ -3015,35 +2972,35 @@
           <a:p>
             <a:pPr lvl="0"/>
             <a:r>
-              <a:rPr lang="it-IT"/>
+              <a:rPr lang="it-IT" smtClean="0"/>
               <a:t>Modifica gli stili del testo dello schema</a:t>
             </a:r>
           </a:p>
           <a:p>
             <a:pPr lvl="1"/>
             <a:r>
-              <a:rPr lang="it-IT"/>
+              <a:rPr lang="it-IT" smtClean="0"/>
               <a:t>Secondo livello</a:t>
             </a:r>
           </a:p>
           <a:p>
             <a:pPr lvl="2"/>
             <a:r>
-              <a:rPr lang="it-IT"/>
+              <a:rPr lang="it-IT" smtClean="0"/>
               <a:t>Terzo livello</a:t>
             </a:r>
           </a:p>
           <a:p>
             <a:pPr lvl="3"/>
             <a:r>
-              <a:rPr lang="it-IT"/>
+              <a:rPr lang="it-IT" smtClean="0"/>
               <a:t>Quarto livello</a:t>
             </a:r>
           </a:p>
           <a:p>
             <a:pPr lvl="4"/>
             <a:r>
-              <a:rPr lang="it-IT"/>
+              <a:rPr lang="it-IT" smtClean="0"/>
               <a:t>Quinto livello</a:t>
             </a:r>
             <a:endParaRPr lang="en-US" dirty="0"/>
@@ -3067,7 +3024,7 @@
           <a:p>
             <a:fld id="{D531FE41-B64C-455A-91F0-E108D3BD53E9}" type="datetimeFigureOut">
               <a:rPr lang="it-IT" smtClean="0"/>
-              <a:t>04/09/2020</a:t>
+              <a:t>07/09/2020</a:t>
             </a:fld>
             <a:endParaRPr lang="it-IT"/>
           </a:p>
@@ -3118,7 +3075,7 @@
     </p:spTree>
     <p:extLst>
       <p:ext uri="{BB962C8B-B14F-4D97-AF65-F5344CB8AC3E}">
-        <p14:creationId xmlns:p14="http://schemas.microsoft.com/office/powerpoint/2010/main" val="1120421961"/>
+        <p14:creationId xmlns:p14="http://schemas.microsoft.com/office/powerpoint/2010/main" val="3209948449"/>
       </p:ext>
     </p:extLst>
   </p:cSld>
@@ -3166,8 +3123,8 @@
           <a:lstStyle/>
           <a:p>
             <a:r>
-              <a:rPr lang="it-IT"/>
-              <a:t>Fare clic per modificare lo stile del titolo dello schema</a:t>
+              <a:rPr lang="it-IT" smtClean="0"/>
+              <a:t>Fare clic per modificare lo stile del titolo</a:t>
             </a:r>
             <a:endParaRPr lang="en-US" dirty="0"/>
           </a:p>
@@ -3195,35 +3152,35 @@
           <a:p>
             <a:pPr lvl="0"/>
             <a:r>
-              <a:rPr lang="it-IT"/>
+              <a:rPr lang="it-IT" smtClean="0"/>
               <a:t>Modifica gli stili del testo dello schema</a:t>
             </a:r>
           </a:p>
           <a:p>
             <a:pPr lvl="1"/>
             <a:r>
-              <a:rPr lang="it-IT"/>
+              <a:rPr lang="it-IT" smtClean="0"/>
               <a:t>Secondo livello</a:t>
             </a:r>
           </a:p>
           <a:p>
             <a:pPr lvl="2"/>
             <a:r>
-              <a:rPr lang="it-IT"/>
+              <a:rPr lang="it-IT" smtClean="0"/>
               <a:t>Terzo livello</a:t>
             </a:r>
           </a:p>
           <a:p>
             <a:pPr lvl="3"/>
             <a:r>
-              <a:rPr lang="it-IT"/>
+              <a:rPr lang="it-IT" smtClean="0"/>
               <a:t>Quarto livello</a:t>
             </a:r>
           </a:p>
           <a:p>
             <a:pPr lvl="4"/>
             <a:r>
-              <a:rPr lang="it-IT"/>
+              <a:rPr lang="it-IT" smtClean="0"/>
               <a:t>Quinto livello</a:t>
             </a:r>
             <a:endParaRPr lang="en-US" dirty="0"/>
@@ -3247,7 +3204,7 @@
           <a:p>
             <a:fld id="{D531FE41-B64C-455A-91F0-E108D3BD53E9}" type="datetimeFigureOut">
               <a:rPr lang="it-IT" smtClean="0"/>
-              <a:t>04/09/2020</a:t>
+              <a:t>07/09/2020</a:t>
             </a:fld>
             <a:endParaRPr lang="it-IT"/>
           </a:p>
@@ -3298,7 +3255,7 @@
     </p:spTree>
     <p:extLst>
       <p:ext uri="{BB962C8B-B14F-4D97-AF65-F5344CB8AC3E}">
-        <p14:creationId xmlns:p14="http://schemas.microsoft.com/office/powerpoint/2010/main" val="1770556567"/>
+        <p14:creationId xmlns:p14="http://schemas.microsoft.com/office/powerpoint/2010/main" val="3936601190"/>
       </p:ext>
     </p:extLst>
   </p:cSld>
@@ -3341,8 +3298,8 @@
           <a:lstStyle/>
           <a:p>
             <a:r>
-              <a:rPr lang="it-IT"/>
-              <a:t>Fare clic per modificare lo stile del titolo dello schema</a:t>
+              <a:rPr lang="it-IT" smtClean="0"/>
+              <a:t>Fare clic per modificare lo stile del titolo</a:t>
             </a:r>
             <a:endParaRPr lang="en-US" dirty="0"/>
           </a:p>
@@ -3365,35 +3322,35 @@
           <a:p>
             <a:pPr lvl="0"/>
             <a:r>
-              <a:rPr lang="it-IT"/>
+              <a:rPr lang="it-IT" smtClean="0"/>
               <a:t>Modifica gli stili del testo dello schema</a:t>
             </a:r>
           </a:p>
           <a:p>
             <a:pPr lvl="1"/>
             <a:r>
-              <a:rPr lang="it-IT"/>
+              <a:rPr lang="it-IT" smtClean="0"/>
               <a:t>Secondo livello</a:t>
             </a:r>
           </a:p>
           <a:p>
             <a:pPr lvl="2"/>
             <a:r>
-              <a:rPr lang="it-IT"/>
+              <a:rPr lang="it-IT" smtClean="0"/>
               <a:t>Terzo livello</a:t>
             </a:r>
           </a:p>
           <a:p>
             <a:pPr lvl="3"/>
             <a:r>
-              <a:rPr lang="it-IT"/>
+              <a:rPr lang="it-IT" smtClean="0"/>
               <a:t>Quarto livello</a:t>
             </a:r>
           </a:p>
           <a:p>
             <a:pPr lvl="4"/>
             <a:r>
-              <a:rPr lang="it-IT"/>
+              <a:rPr lang="it-IT" smtClean="0"/>
               <a:t>Quinto livello</a:t>
             </a:r>
             <a:endParaRPr lang="en-US" dirty="0"/>
@@ -3402,7 +3359,7 @@
       </p:sp>
       <p:sp>
         <p:nvSpPr>
-          <p:cNvPr id="7" name="Date Placeholder 3"/>
+          <p:cNvPr id="4" name="Date Placeholder 3"/>
           <p:cNvSpPr>
             <a:spLocks noGrp="1"/>
           </p:cNvSpPr>
@@ -3417,7 +3374,7 @@
           <a:p>
             <a:fld id="{D531FE41-B64C-455A-91F0-E108D3BD53E9}" type="datetimeFigureOut">
               <a:rPr lang="it-IT" smtClean="0"/>
-              <a:t>04/09/2020</a:t>
+              <a:t>07/09/2020</a:t>
             </a:fld>
             <a:endParaRPr lang="it-IT"/>
           </a:p>
@@ -3468,7 +3425,7 @@
     </p:spTree>
     <p:extLst>
       <p:ext uri="{BB962C8B-B14F-4D97-AF65-F5344CB8AC3E}">
-        <p14:creationId xmlns:p14="http://schemas.microsoft.com/office/powerpoint/2010/main" val="3691021420"/>
+        <p14:creationId xmlns:p14="http://schemas.microsoft.com/office/powerpoint/2010/main" val="555371155"/>
       </p:ext>
     </p:extLst>
   </p:cSld>
@@ -3520,8 +3477,8 @@
           </a:lstStyle>
           <a:p>
             <a:r>
-              <a:rPr lang="it-IT"/>
-              <a:t>Fare clic per modificare lo stile del titolo dello schema</a:t>
+              <a:rPr lang="it-IT" smtClean="0"/>
+              <a:t>Fare clic per modificare lo stile del titolo</a:t>
             </a:r>
             <a:endParaRPr lang="en-US" dirty="0"/>
           </a:p>
@@ -3550,10 +3507,7 @@
               <a:buNone/>
               <a:defRPr sz="2000" cap="all">
                 <a:solidFill>
-                  <a:schemeClr val="bg2">
-                    <a:lumMod val="40000"/>
-                    <a:lumOff val="60000"/>
-                  </a:schemeClr>
+                  <a:schemeClr val="accent1"/>
                 </a:solidFill>
               </a:defRPr>
             </a:lvl1pPr>
@@ -3641,7 +3595,7 @@
           <a:p>
             <a:pPr lvl="0"/>
             <a:r>
-              <a:rPr lang="it-IT"/>
+              <a:rPr lang="it-IT" smtClean="0"/>
               <a:t>Modifica gli stili del testo dello schema</a:t>
             </a:r>
           </a:p>
@@ -3664,7 +3618,7 @@
           <a:p>
             <a:fld id="{D531FE41-B64C-455A-91F0-E108D3BD53E9}" type="datetimeFigureOut">
               <a:rPr lang="it-IT" smtClean="0"/>
-              <a:t>04/09/2020</a:t>
+              <a:t>07/09/2020</a:t>
             </a:fld>
             <a:endParaRPr lang="it-IT"/>
           </a:p>
@@ -3715,7 +3669,7 @@
     </p:spTree>
     <p:extLst>
       <p:ext uri="{BB962C8B-B14F-4D97-AF65-F5344CB8AC3E}">
-        <p14:creationId xmlns:p14="http://schemas.microsoft.com/office/powerpoint/2010/main" val="857838357"/>
+        <p14:creationId xmlns:p14="http://schemas.microsoft.com/office/powerpoint/2010/main" val="530699609"/>
       </p:ext>
     </p:extLst>
   </p:cSld>
@@ -3758,8 +3712,8 @@
           <a:lstStyle/>
           <a:p>
             <a:r>
-              <a:rPr lang="it-IT"/>
-              <a:t>Fare clic per modificare lo stile del titolo dello schema</a:t>
+              <a:rPr lang="it-IT" smtClean="0"/>
+              <a:t>Fare clic per modificare lo stile del titolo</a:t>
             </a:r>
             <a:endParaRPr lang="en-US" dirty="0"/>
           </a:p>
@@ -3817,35 +3771,35 @@
           <a:p>
             <a:pPr lvl="0"/>
             <a:r>
-              <a:rPr lang="it-IT"/>
+              <a:rPr lang="it-IT" smtClean="0"/>
               <a:t>Modifica gli stili del testo dello schema</a:t>
             </a:r>
           </a:p>
           <a:p>
             <a:pPr lvl="1"/>
             <a:r>
-              <a:rPr lang="it-IT"/>
+              <a:rPr lang="it-IT" smtClean="0"/>
               <a:t>Secondo livello</a:t>
             </a:r>
           </a:p>
           <a:p>
             <a:pPr lvl="2"/>
             <a:r>
-              <a:rPr lang="it-IT"/>
+              <a:rPr lang="it-IT" smtClean="0"/>
               <a:t>Terzo livello</a:t>
             </a:r>
           </a:p>
           <a:p>
             <a:pPr lvl="3"/>
             <a:r>
-              <a:rPr lang="it-IT"/>
+              <a:rPr lang="it-IT" smtClean="0"/>
               <a:t>Quarto livello</a:t>
             </a:r>
           </a:p>
           <a:p>
             <a:pPr lvl="4"/>
             <a:r>
-              <a:rPr lang="it-IT"/>
+              <a:rPr lang="it-IT" smtClean="0"/>
               <a:t>Quinto livello</a:t>
             </a:r>
             <a:endParaRPr lang="en-US" dirty="0"/>
@@ -3904,35 +3858,35 @@
           <a:p>
             <a:pPr lvl="0"/>
             <a:r>
-              <a:rPr lang="it-IT"/>
+              <a:rPr lang="it-IT" smtClean="0"/>
               <a:t>Modifica gli stili del testo dello schema</a:t>
             </a:r>
           </a:p>
           <a:p>
             <a:pPr lvl="1"/>
             <a:r>
-              <a:rPr lang="it-IT"/>
+              <a:rPr lang="it-IT" smtClean="0"/>
               <a:t>Secondo livello</a:t>
             </a:r>
           </a:p>
           <a:p>
             <a:pPr lvl="2"/>
             <a:r>
-              <a:rPr lang="it-IT"/>
+              <a:rPr lang="it-IT" smtClean="0"/>
               <a:t>Terzo livello</a:t>
             </a:r>
           </a:p>
           <a:p>
             <a:pPr lvl="3"/>
             <a:r>
-              <a:rPr lang="it-IT"/>
+              <a:rPr lang="it-IT" smtClean="0"/>
               <a:t>Quarto livello</a:t>
             </a:r>
           </a:p>
           <a:p>
             <a:pPr lvl="4"/>
             <a:r>
-              <a:rPr lang="it-IT"/>
+              <a:rPr lang="it-IT" smtClean="0"/>
               <a:t>Quinto livello</a:t>
             </a:r>
             <a:endParaRPr lang="en-US" dirty="0"/>
@@ -3956,7 +3910,7 @@
           <a:p>
             <a:fld id="{D531FE41-B64C-455A-91F0-E108D3BD53E9}" type="datetimeFigureOut">
               <a:rPr lang="it-IT" smtClean="0"/>
-              <a:t>04/09/2020</a:t>
+              <a:t>07/09/2020</a:t>
             </a:fld>
             <a:endParaRPr lang="it-IT"/>
           </a:p>
@@ -4007,7 +3961,7 @@
     </p:spTree>
     <p:extLst>
       <p:ext uri="{BB962C8B-B14F-4D97-AF65-F5344CB8AC3E}">
-        <p14:creationId xmlns:p14="http://schemas.microsoft.com/office/powerpoint/2010/main" val="3174350212"/>
+        <p14:creationId xmlns:p14="http://schemas.microsoft.com/office/powerpoint/2010/main" val="1961031454"/>
       </p:ext>
     </p:extLst>
   </p:cSld>
@@ -4054,8 +4008,8 @@
           </a:lstStyle>
           <a:p>
             <a:r>
-              <a:rPr lang="it-IT"/>
-              <a:t>Fare clic per modificare lo stile del titolo dello schema</a:t>
+              <a:rPr lang="it-IT" smtClean="0"/>
+              <a:t>Fare clic per modificare lo stile del titolo</a:t>
             </a:r>
             <a:endParaRPr lang="en-US" dirty="0"/>
           </a:p>
@@ -4086,10 +4040,7 @@
               <a:buNone/>
               <a:defRPr sz="2400" b="0">
                 <a:solidFill>
-                  <a:schemeClr val="bg2">
-                    <a:lumMod val="40000"/>
-                    <a:lumOff val="60000"/>
-                  </a:schemeClr>
+                  <a:schemeClr val="accent1"/>
                 </a:solidFill>
               </a:defRPr>
             </a:lvl1pPr>
@@ -4129,7 +4080,7 @@
           <a:p>
             <a:pPr lvl="0"/>
             <a:r>
-              <a:rPr lang="it-IT"/>
+              <a:rPr lang="it-IT" smtClean="0"/>
               <a:t>Modifica gli stili del testo dello schema</a:t>
             </a:r>
           </a:p>
@@ -4187,35 +4138,35 @@
           <a:p>
             <a:pPr lvl="0"/>
             <a:r>
-              <a:rPr lang="it-IT"/>
+              <a:rPr lang="it-IT" smtClean="0"/>
               <a:t>Modifica gli stili del testo dello schema</a:t>
             </a:r>
           </a:p>
           <a:p>
             <a:pPr lvl="1"/>
             <a:r>
-              <a:rPr lang="it-IT"/>
+              <a:rPr lang="it-IT" smtClean="0"/>
               <a:t>Secondo livello</a:t>
             </a:r>
           </a:p>
           <a:p>
             <a:pPr lvl="2"/>
             <a:r>
-              <a:rPr lang="it-IT"/>
+              <a:rPr lang="it-IT" smtClean="0"/>
               <a:t>Terzo livello</a:t>
             </a:r>
           </a:p>
           <a:p>
             <a:pPr lvl="3"/>
             <a:r>
-              <a:rPr lang="it-IT"/>
+              <a:rPr lang="it-IT" smtClean="0"/>
               <a:t>Quarto livello</a:t>
             </a:r>
           </a:p>
           <a:p>
             <a:pPr lvl="4"/>
             <a:r>
-              <a:rPr lang="it-IT"/>
+              <a:rPr lang="it-IT" smtClean="0"/>
               <a:t>Quinto livello</a:t>
             </a:r>
             <a:endParaRPr lang="en-US" dirty="0"/>
@@ -4247,10 +4198,7 @@
               <a:buNone/>
               <a:defRPr sz="2400" b="0">
                 <a:solidFill>
-                  <a:schemeClr val="bg2">
-                    <a:lumMod val="40000"/>
-                    <a:lumOff val="60000"/>
-                  </a:schemeClr>
+                  <a:schemeClr val="accent1"/>
                 </a:solidFill>
               </a:defRPr>
             </a:lvl1pPr>
@@ -4290,7 +4238,7 @@
           <a:p>
             <a:pPr lvl="0"/>
             <a:r>
-              <a:rPr lang="it-IT"/>
+              <a:rPr lang="it-IT" smtClean="0"/>
               <a:t>Modifica gli stili del testo dello schema</a:t>
             </a:r>
           </a:p>
@@ -4348,35 +4296,35 @@
           <a:p>
             <a:pPr lvl="0"/>
             <a:r>
-              <a:rPr lang="it-IT"/>
+              <a:rPr lang="it-IT" smtClean="0"/>
               <a:t>Modifica gli stili del testo dello schema</a:t>
             </a:r>
           </a:p>
           <a:p>
             <a:pPr lvl="1"/>
             <a:r>
-              <a:rPr lang="it-IT"/>
+              <a:rPr lang="it-IT" smtClean="0"/>
               <a:t>Secondo livello</a:t>
             </a:r>
           </a:p>
           <a:p>
             <a:pPr lvl="2"/>
             <a:r>
-              <a:rPr lang="it-IT"/>
+              <a:rPr lang="it-IT" smtClean="0"/>
               <a:t>Terzo livello</a:t>
             </a:r>
           </a:p>
           <a:p>
             <a:pPr lvl="3"/>
             <a:r>
-              <a:rPr lang="it-IT"/>
+              <a:rPr lang="it-IT" smtClean="0"/>
               <a:t>Quarto livello</a:t>
             </a:r>
           </a:p>
           <a:p>
             <a:pPr lvl="4"/>
             <a:r>
-              <a:rPr lang="it-IT"/>
+              <a:rPr lang="it-IT" smtClean="0"/>
               <a:t>Quinto livello</a:t>
             </a:r>
             <a:endParaRPr lang="en-US" dirty="0"/>
@@ -4400,7 +4348,7 @@
           <a:p>
             <a:fld id="{D531FE41-B64C-455A-91F0-E108D3BD53E9}" type="datetimeFigureOut">
               <a:rPr lang="it-IT" smtClean="0"/>
-              <a:t>04/09/2020</a:t>
+              <a:t>07/09/2020</a:t>
             </a:fld>
             <a:endParaRPr lang="it-IT"/>
           </a:p>
@@ -4451,7 +4399,7 @@
     </p:spTree>
     <p:extLst>
       <p:ext uri="{BB962C8B-B14F-4D97-AF65-F5344CB8AC3E}">
-        <p14:creationId xmlns:p14="http://schemas.microsoft.com/office/powerpoint/2010/main" val="142755332"/>
+        <p14:creationId xmlns:p14="http://schemas.microsoft.com/office/powerpoint/2010/main" val="3821871251"/>
       </p:ext>
     </p:extLst>
   </p:cSld>
@@ -4494,8 +4442,8 @@
           <a:lstStyle/>
           <a:p>
             <a:r>
-              <a:rPr lang="it-IT"/>
-              <a:t>Fare clic per modificare lo stile del titolo dello schema</a:t>
+              <a:rPr lang="it-IT" smtClean="0"/>
+              <a:t>Fare clic per modificare lo stile del titolo</a:t>
             </a:r>
             <a:endParaRPr lang="en-US" dirty="0"/>
           </a:p>
@@ -4518,7 +4466,7 @@
           <a:p>
             <a:fld id="{D531FE41-B64C-455A-91F0-E108D3BD53E9}" type="datetimeFigureOut">
               <a:rPr lang="it-IT" smtClean="0"/>
-              <a:t>04/09/2020</a:t>
+              <a:t>07/09/2020</a:t>
             </a:fld>
             <a:endParaRPr lang="it-IT"/>
           </a:p>
@@ -4569,7 +4517,7 @@
     </p:spTree>
     <p:extLst>
       <p:ext uri="{BB962C8B-B14F-4D97-AF65-F5344CB8AC3E}">
-        <p14:creationId xmlns:p14="http://schemas.microsoft.com/office/powerpoint/2010/main" val="1881756819"/>
+        <p14:creationId xmlns:p14="http://schemas.microsoft.com/office/powerpoint/2010/main" val="1572504802"/>
       </p:ext>
     </p:extLst>
   </p:cSld>
@@ -4613,7 +4561,7 @@
           <a:p>
             <a:fld id="{D531FE41-B64C-455A-91F0-E108D3BD53E9}" type="datetimeFigureOut">
               <a:rPr lang="it-IT" smtClean="0"/>
-              <a:t>04/09/2020</a:t>
+              <a:t>07/09/2020</a:t>
             </a:fld>
             <a:endParaRPr lang="it-IT"/>
           </a:p>
@@ -4664,7 +4612,7 @@
     </p:spTree>
     <p:extLst>
       <p:ext uri="{BB962C8B-B14F-4D97-AF65-F5344CB8AC3E}">
-        <p14:creationId xmlns:p14="http://schemas.microsoft.com/office/powerpoint/2010/main" val="541078149"/>
+        <p14:creationId xmlns:p14="http://schemas.microsoft.com/office/powerpoint/2010/main" val="3885216580"/>
       </p:ext>
     </p:extLst>
   </p:cSld>
@@ -4703,7 +4651,7 @@
         </p:nvSpPr>
         <p:spPr>
           <a:xfrm>
-            <a:off x="1154953" y="1447800"/>
+            <a:off x="1154954" y="1447800"/>
             <a:ext cx="3401064" cy="1447800"/>
           </a:xfrm>
         </p:spPr>
@@ -4716,8 +4664,8 @@
           </a:lstStyle>
           <a:p>
             <a:r>
-              <a:rPr lang="it-IT"/>
-              <a:t>Fare clic per modificare lo stile del titolo dello schema</a:t>
+              <a:rPr lang="it-IT" smtClean="0"/>
+              <a:t>Fare clic per modificare lo stile del titolo</a:t>
             </a:r>
             <a:endParaRPr lang="en-US" dirty="0"/>
           </a:p>
@@ -4775,35 +4723,35 @@
           <a:p>
             <a:pPr lvl="0"/>
             <a:r>
-              <a:rPr lang="it-IT"/>
+              <a:rPr lang="it-IT" smtClean="0"/>
               <a:t>Modifica gli stili del testo dello schema</a:t>
             </a:r>
           </a:p>
           <a:p>
             <a:pPr lvl="1"/>
             <a:r>
-              <a:rPr lang="it-IT"/>
+              <a:rPr lang="it-IT" smtClean="0"/>
               <a:t>Secondo livello</a:t>
             </a:r>
           </a:p>
           <a:p>
             <a:pPr lvl="2"/>
             <a:r>
-              <a:rPr lang="it-IT"/>
+              <a:rPr lang="it-IT" smtClean="0"/>
               <a:t>Terzo livello</a:t>
             </a:r>
           </a:p>
           <a:p>
             <a:pPr lvl="3"/>
             <a:r>
-              <a:rPr lang="it-IT"/>
+              <a:rPr lang="it-IT" smtClean="0"/>
               <a:t>Quarto livello</a:t>
             </a:r>
           </a:p>
           <a:p>
             <a:pPr lvl="4"/>
             <a:r>
-              <a:rPr lang="it-IT"/>
+              <a:rPr lang="it-IT" smtClean="0"/>
               <a:t>Quinto livello</a:t>
             </a:r>
             <a:endParaRPr lang="en-US" dirty="0"/>
@@ -4822,7 +4770,7 @@
         </p:nvSpPr>
         <p:spPr>
           <a:xfrm>
-            <a:off x="1154953" y="3129280"/>
+            <a:off x="1154954" y="3129280"/>
             <a:ext cx="3401063" cy="2895599"/>
           </a:xfrm>
         </p:spPr>
@@ -4869,7 +4817,7 @@
           <a:p>
             <a:pPr lvl="0"/>
             <a:r>
-              <a:rPr lang="it-IT"/>
+              <a:rPr lang="it-IT" smtClean="0"/>
               <a:t>Modifica gli stili del testo dello schema</a:t>
             </a:r>
           </a:p>
@@ -4892,7 +4840,7 @@
           <a:p>
             <a:fld id="{D531FE41-B64C-455A-91F0-E108D3BD53E9}" type="datetimeFigureOut">
               <a:rPr lang="it-IT" smtClean="0"/>
-              <a:t>04/09/2020</a:t>
+              <a:t>07/09/2020</a:t>
             </a:fld>
             <a:endParaRPr lang="it-IT"/>
           </a:p>
@@ -4943,7 +4891,7 @@
     </p:spTree>
     <p:extLst>
       <p:ext uri="{BB962C8B-B14F-4D97-AF65-F5344CB8AC3E}">
-        <p14:creationId xmlns:p14="http://schemas.microsoft.com/office/powerpoint/2010/main" val="4001684713"/>
+        <p14:creationId xmlns:p14="http://schemas.microsoft.com/office/powerpoint/2010/main" val="91328604"/>
       </p:ext>
     </p:extLst>
   </p:cSld>
@@ -4997,8 +4945,8 @@
           </a:lstStyle>
           <a:p>
             <a:r>
-              <a:rPr lang="it-IT"/>
-              <a:t>Fare clic per modificare lo stile del titolo dello schema</a:t>
+              <a:rPr lang="it-IT" smtClean="0"/>
+              <a:t>Fare clic per modificare lo stile del titolo</a:t>
             </a:r>
             <a:endParaRPr lang="en-US" dirty="0"/>
           </a:p>
@@ -5076,7 +5024,7 @@
           </a:lstStyle>
           <a:p>
             <a:r>
-              <a:rPr lang="it-IT"/>
+              <a:rPr lang="it-IT" smtClean="0"/>
               <a:t>Fare clic sull'icona per inserire un'immagine</a:t>
             </a:r>
             <a:endParaRPr lang="en-US" dirty="0"/>
@@ -5144,7 +5092,7 @@
           <a:p>
             <a:pPr lvl="0"/>
             <a:r>
-              <a:rPr lang="it-IT"/>
+              <a:rPr lang="it-IT" smtClean="0"/>
               <a:t>Modifica gli stili del testo dello schema</a:t>
             </a:r>
           </a:p>
@@ -5167,7 +5115,7 @@
           <a:p>
             <a:fld id="{D531FE41-B64C-455A-91F0-E108D3BD53E9}" type="datetimeFigureOut">
               <a:rPr lang="it-IT" smtClean="0"/>
-              <a:t>04/09/2020</a:t>
+              <a:t>07/09/2020</a:t>
             </a:fld>
             <a:endParaRPr lang="it-IT"/>
           </a:p>
@@ -5218,7 +5166,7 @@
     </p:spTree>
     <p:extLst>
       <p:ext uri="{BB962C8B-B14F-4D97-AF65-F5344CB8AC3E}">
-        <p14:creationId xmlns:p14="http://schemas.microsoft.com/office/powerpoint/2010/main" val="2195115506"/>
+        <p14:creationId xmlns:p14="http://schemas.microsoft.com/office/powerpoint/2010/main" val="2585723240"/>
       </p:ext>
     </p:extLst>
   </p:cSld>
@@ -5326,22 +5274,22 @@
             <a:gsLst>
               <a:gs pos="0">
                 <a:schemeClr val="bg2">
-                  <a:lumMod val="60000"/>
-                  <a:lumOff val="40000"/>
+                  <a:lumMod val="40000"/>
+                  <a:lumOff val="60000"/>
                   <a:alpha val="7000"/>
                 </a:schemeClr>
               </a:gs>
               <a:gs pos="69000">
                 <a:schemeClr val="bg2">
-                  <a:lumMod val="60000"/>
-                  <a:lumOff val="40000"/>
+                  <a:lumMod val="40000"/>
+                  <a:lumOff val="60000"/>
                   <a:alpha val="0"/>
                 </a:schemeClr>
               </a:gs>
               <a:gs pos="36000">
                 <a:schemeClr val="bg2">
-                  <a:lumMod val="60000"/>
-                  <a:lumOff val="40000"/>
+                  <a:lumMod val="40000"/>
+                  <a:lumOff val="60000"/>
                   <a:alpha val="6000"/>
                 </a:schemeClr>
               </a:gs>
@@ -5421,7 +5369,7 @@
         </p:blipFill>
         <p:spPr>
           <a:xfrm>
-            <a:off x="8605878" y="6096000"/>
+            <a:off x="8609012" y="6096000"/>
             <a:ext cx="993734" cy="762000"/>
           </a:xfrm>
           <a:prstGeom prst="rect">
@@ -5491,8 +5439,8 @@
           <a:lstStyle/>
           <a:p>
             <a:r>
-              <a:rPr lang="it-IT"/>
-              <a:t>Fare clic per modificare lo stile del titolo dello schema</a:t>
+              <a:rPr lang="it-IT" smtClean="0"/>
+              <a:t>Fare clic per modificare lo stile del titolo</a:t>
             </a:r>
             <a:endParaRPr lang="en-US" dirty="0"/>
           </a:p>
@@ -5525,35 +5473,35 @@
           <a:p>
             <a:pPr lvl="0"/>
             <a:r>
-              <a:rPr lang="it-IT"/>
+              <a:rPr lang="it-IT" smtClean="0"/>
               <a:t>Modifica gli stili del testo dello schema</a:t>
             </a:r>
           </a:p>
           <a:p>
             <a:pPr lvl="1"/>
             <a:r>
-              <a:rPr lang="it-IT"/>
+              <a:rPr lang="it-IT" smtClean="0"/>
               <a:t>Secondo livello</a:t>
             </a:r>
           </a:p>
           <a:p>
             <a:pPr lvl="2"/>
             <a:r>
-              <a:rPr lang="it-IT"/>
+              <a:rPr lang="it-IT" smtClean="0"/>
               <a:t>Terzo livello</a:t>
             </a:r>
           </a:p>
           <a:p>
             <a:pPr lvl="3"/>
             <a:r>
-              <a:rPr lang="it-IT"/>
+              <a:rPr lang="it-IT" smtClean="0"/>
               <a:t>Quarto livello</a:t>
             </a:r>
           </a:p>
           <a:p>
             <a:pPr lvl="4"/>
             <a:r>
-              <a:rPr lang="it-IT"/>
+              <a:rPr lang="it-IT" smtClean="0"/>
               <a:t>Quinto livello</a:t>
             </a:r>
             <a:endParaRPr lang="en-US" dirty="0"/>
@@ -5596,7 +5544,7 @@
           <a:p>
             <a:fld id="{D531FE41-B64C-455A-91F0-E108D3BD53E9}" type="datetimeFigureOut">
               <a:rPr lang="it-IT" smtClean="0"/>
-              <a:t>04/09/2020</a:t>
+              <a:t>07/09/2020</a:t>
             </a:fld>
             <a:endParaRPr lang="it-IT"/>
           </a:p>
@@ -5650,7 +5598,7 @@
             <p:ph type="sldNum" sz="quarter" idx="4"/>
           </p:nvPr>
         </p:nvSpPr>
-        <p:spPr bwMode="gray">
+        <p:spPr>
           <a:xfrm>
             <a:off x="10352540" y="295729"/>
             <a:ext cx="838199" cy="767687"/>
@@ -5684,29 +5632,29 @@
     </p:spTree>
     <p:extLst>
       <p:ext uri="{BB962C8B-B14F-4D97-AF65-F5344CB8AC3E}">
-        <p14:creationId xmlns:p14="http://schemas.microsoft.com/office/powerpoint/2010/main" val="2841823281"/>
+        <p14:creationId xmlns:p14="http://schemas.microsoft.com/office/powerpoint/2010/main" val="1069230257"/>
       </p:ext>
     </p:extLst>
   </p:cSld>
   <p:clrMap bg1="dk1" tx1="lt1" bg2="dk2" tx2="lt2" accent1="accent1" accent2="accent2" accent3="accent3" accent4="accent4" accent5="accent5" accent6="accent6" hlink="hlink" folHlink="folHlink"/>
   <p:sldLayoutIdLst>
-    <p:sldLayoutId id="2147483691" r:id="rId1"/>
-    <p:sldLayoutId id="2147483692" r:id="rId2"/>
-    <p:sldLayoutId id="2147483693" r:id="rId3"/>
-    <p:sldLayoutId id="2147483694" r:id="rId4"/>
-    <p:sldLayoutId id="2147483695" r:id="rId5"/>
-    <p:sldLayoutId id="2147483696" r:id="rId6"/>
-    <p:sldLayoutId id="2147483697" r:id="rId7"/>
-    <p:sldLayoutId id="2147483698" r:id="rId8"/>
-    <p:sldLayoutId id="2147483699" r:id="rId9"/>
-    <p:sldLayoutId id="2147483700" r:id="rId10"/>
-    <p:sldLayoutId id="2147483701" r:id="rId11"/>
-    <p:sldLayoutId id="2147483702" r:id="rId12"/>
-    <p:sldLayoutId id="2147483703" r:id="rId13"/>
-    <p:sldLayoutId id="2147483704" r:id="rId14"/>
-    <p:sldLayoutId id="2147483705" r:id="rId15"/>
-    <p:sldLayoutId id="2147483706" r:id="rId16"/>
-    <p:sldLayoutId id="2147483707" r:id="rId17"/>
+    <p:sldLayoutId id="2147483709" r:id="rId1"/>
+    <p:sldLayoutId id="2147483710" r:id="rId2"/>
+    <p:sldLayoutId id="2147483711" r:id="rId3"/>
+    <p:sldLayoutId id="2147483712" r:id="rId4"/>
+    <p:sldLayoutId id="2147483713" r:id="rId5"/>
+    <p:sldLayoutId id="2147483714" r:id="rId6"/>
+    <p:sldLayoutId id="2147483715" r:id="rId7"/>
+    <p:sldLayoutId id="2147483716" r:id="rId8"/>
+    <p:sldLayoutId id="2147483717" r:id="rId9"/>
+    <p:sldLayoutId id="2147483718" r:id="rId10"/>
+    <p:sldLayoutId id="2147483719" r:id="rId11"/>
+    <p:sldLayoutId id="2147483720" r:id="rId12"/>
+    <p:sldLayoutId id="2147483721" r:id="rId13"/>
+    <p:sldLayoutId id="2147483722" r:id="rId14"/>
+    <p:sldLayoutId id="2147483723" r:id="rId15"/>
+    <p:sldLayoutId id="2147483724" r:id="rId16"/>
+    <p:sldLayoutId id="2147483725" r:id="rId17"/>
   </p:sldLayoutIdLst>
   <p:txStyles>
     <p:titleStyle>
@@ -5790,10 +5738,7 @@
           <a:spcPts val="0"/>
         </a:spcAft>
         <a:buClr>
-          <a:schemeClr val="bg2">
-            <a:lumMod val="40000"/>
-            <a:lumOff val="60000"/>
-          </a:schemeClr>
+          <a:schemeClr val="accent1"/>
         </a:buClr>
         <a:buSzPct val="80000"/>
         <a:buFont typeface="Wingdings 3" charset="2"/>
@@ -5815,10 +5760,7 @@
           <a:spcPts val="0"/>
         </a:spcAft>
         <a:buClr>
-          <a:schemeClr val="bg2">
-            <a:lumMod val="40000"/>
-            <a:lumOff val="60000"/>
-          </a:schemeClr>
+          <a:schemeClr val="accent1"/>
         </a:buClr>
         <a:buSzPct val="80000"/>
         <a:buFont typeface="Wingdings 3" charset="2"/>
@@ -5840,10 +5782,7 @@
           <a:spcPts val="0"/>
         </a:spcAft>
         <a:buClr>
-          <a:schemeClr val="bg2">
-            <a:lumMod val="40000"/>
-            <a:lumOff val="60000"/>
-          </a:schemeClr>
+          <a:schemeClr val="accent1"/>
         </a:buClr>
         <a:buSzPct val="80000"/>
         <a:buFont typeface="Wingdings 3" charset="2"/>
@@ -5865,10 +5804,7 @@
           <a:spcPts val="0"/>
         </a:spcAft>
         <a:buClr>
-          <a:schemeClr val="bg2">
-            <a:lumMod val="40000"/>
-            <a:lumOff val="60000"/>
-          </a:schemeClr>
+          <a:schemeClr val="accent1"/>
         </a:buClr>
         <a:buSzPct val="80000"/>
         <a:buFont typeface="Wingdings 3" charset="2"/>
@@ -5890,10 +5826,7 @@
           <a:spcPts val="0"/>
         </a:spcAft>
         <a:buClr>
-          <a:schemeClr val="bg2">
-            <a:lumMod val="40000"/>
-            <a:lumOff val="60000"/>
-          </a:schemeClr>
+          <a:schemeClr val="accent1"/>
         </a:buClr>
         <a:buSzPct val="80000"/>
         <a:buFont typeface="Wingdings 3" charset="2"/>
@@ -5907,7 +5840,7 @@
           <a:cs typeface="+mj-cs"/>
         </a:defRPr>
       </a:lvl5pPr>
-      <a:lvl6pPr marL="2506000" indent="-228600" algn="l" defTabSz="457200" rtl="0" eaLnBrk="1" latinLnBrk="0" hangingPunct="1">
+      <a:lvl6pPr marL="2514600" indent="-228600" algn="l" defTabSz="457200" rtl="0" eaLnBrk="1" latinLnBrk="0" hangingPunct="1">
         <a:spcBef>
           <a:spcPts val="1000"/>
         </a:spcBef>
@@ -5915,10 +5848,7 @@
           <a:spcPts val="0"/>
         </a:spcAft>
         <a:buClr>
-          <a:schemeClr val="bg2">
-            <a:lumMod val="40000"/>
-            <a:lumOff val="60000"/>
-          </a:schemeClr>
+          <a:schemeClr val="accent1"/>
         </a:buClr>
         <a:buSzPct val="80000"/>
         <a:buFont typeface="Wingdings 3" charset="2"/>
@@ -5940,10 +5870,7 @@
           <a:spcPts val="0"/>
         </a:spcAft>
         <a:buClr>
-          <a:schemeClr val="bg2">
-            <a:lumMod val="40000"/>
-            <a:lumOff val="60000"/>
-          </a:schemeClr>
+          <a:schemeClr val="accent1"/>
         </a:buClr>
         <a:buSzPct val="80000"/>
         <a:buFont typeface="Wingdings 3" charset="2"/>
@@ -5965,10 +5892,7 @@
           <a:spcPts val="0"/>
         </a:spcAft>
         <a:buClr>
-          <a:schemeClr val="bg2">
-            <a:lumMod val="40000"/>
-            <a:lumOff val="60000"/>
-          </a:schemeClr>
+          <a:schemeClr val="accent1"/>
         </a:buClr>
         <a:buSzPct val="80000"/>
         <a:buFont typeface="Wingdings 3" charset="2"/>
@@ -5990,10 +5914,7 @@
           <a:spcPts val="0"/>
         </a:spcAft>
         <a:buClr>
-          <a:schemeClr val="bg2">
-            <a:lumMod val="40000"/>
-            <a:lumOff val="60000"/>
-          </a:schemeClr>
+          <a:schemeClr val="accent1"/>
         </a:buClr>
         <a:buSzPct val="80000"/>
         <a:buFont typeface="Wingdings 3" charset="2"/>
@@ -6142,8 +6063,8 @@
         </p:nvSpPr>
         <p:spPr>
           <a:xfrm>
-            <a:off x="884045" y="2804474"/>
-            <a:ext cx="5158253" cy="1819374"/>
+            <a:off x="884045" y="1802166"/>
+            <a:ext cx="5427978" cy="2821681"/>
           </a:xfrm>
         </p:spPr>
         <p:txBody>
@@ -6156,7 +6077,14 @@
               <a:t> </a:t>
             </a:r>
             <a:r>
-              <a:rPr lang="it-IT" sz="9600" dirty="0">
+              <a:rPr lang="it-IT" sz="13500" dirty="0">
+                <a:effectLst>
+                  <a:outerShdw blurRad="38100" dist="38100" dir="2700000" algn="tl">
+                    <a:srgbClr val="000000">
+                      <a:alpha val="43137"/>
+                    </a:srgbClr>
+                  </a:outerShdw>
+                </a:effectLst>
                 <a:latin typeface="Times New Roman" panose="02020603050405020304" pitchFamily="18" charset="0"/>
                 <a:cs typeface="Times New Roman" panose="02020603050405020304" pitchFamily="18" charset="0"/>
               </a:rPr>
@@ -6742,10 +6670,6 @@
               </a:rPr>
               <a:t>questo step si riceve un output riassuntivo</a:t>
             </a:r>
-            <a:endParaRPr lang="it-IT" dirty="0">
-              <a:latin typeface="Times New Roman" panose="02020603050405020304" pitchFamily="18" charset="0"/>
-              <a:cs typeface="Times New Roman" panose="02020603050405020304" pitchFamily="18" charset="0"/>
-            </a:endParaRPr>
           </a:p>
         </p:txBody>
       </p:sp>
@@ -6944,10 +6868,6 @@
               </a:rPr>
               <a:t>output vengono mostrati nella pagina tutti gli interventi possibili e i meccanismi associati, tenendo conto delle combinazioni di scelte effettuare pocanzi. </a:t>
             </a:r>
-            <a:endParaRPr lang="it-IT" dirty="0">
-              <a:latin typeface="Times New Roman" panose="02020603050405020304" pitchFamily="18" charset="0"/>
-              <a:cs typeface="Times New Roman" panose="02020603050405020304" pitchFamily="18" charset="0"/>
-            </a:endParaRPr>
           </a:p>
         </p:txBody>
       </p:sp>
@@ -7199,8 +7119,8 @@
         </p:blipFill>
         <p:spPr>
           <a:xfrm>
-            <a:off x="4895505" y="4773267"/>
-            <a:ext cx="6249273" cy="497314"/>
+            <a:off x="4784725" y="3527057"/>
+            <a:ext cx="5195888" cy="413486"/>
           </a:xfrm>
         </p:spPr>
       </p:pic>
@@ -7810,13 +7730,6 @@
               </a:rPr>
               <a:t> e post intervento</a:t>
             </a:r>
-            <a:endParaRPr lang="it-IT" dirty="0">
-              <a:solidFill>
-                <a:schemeClr val="bg1"/>
-              </a:solidFill>
-              <a:latin typeface="Times New Roman" panose="02020603050405020304" pitchFamily="18" charset="0"/>
-              <a:cs typeface="Times New Roman" panose="02020603050405020304" pitchFamily="18" charset="0"/>
-            </a:endParaRPr>
           </a:p>
         </p:txBody>
       </p:sp>
@@ -8806,13 +8719,13 @@
         </p:nvSpPr>
         <p:spPr>
           <a:xfrm>
-            <a:off x="1103313" y="1489021"/>
-            <a:ext cx="3440408" cy="4822223"/>
+            <a:off x="1103312" y="1489021"/>
+            <a:ext cx="3877061" cy="4902901"/>
           </a:xfrm>
         </p:spPr>
         <p:txBody>
           <a:bodyPr>
-            <a:normAutofit/>
+            <a:normAutofit fontScale="92500" lnSpcReduction="20000"/>
           </a:bodyPr>
           <a:lstStyle/>
           <a:p>
@@ -8857,14 +8770,7 @@
                 <a:latin typeface="Times New Roman" panose="02020603050405020304" pitchFamily="18" charset="0"/>
                 <a:cs typeface="Times New Roman" panose="02020603050405020304" pitchFamily="18" charset="0"/>
               </a:rPr>
-              <a:t>Probabilmente l’utente </a:t>
-            </a:r>
-            <a:r>
-              <a:rPr lang="it-IT" dirty="0" smtClean="0">
-                <a:latin typeface="Times New Roman" panose="02020603050405020304" pitchFamily="18" charset="0"/>
-                <a:cs typeface="Times New Roman" panose="02020603050405020304" pitchFamily="18" charset="0"/>
-              </a:rPr>
-              <a:t>dovrà </a:t>
+              <a:t>Probabilmente l’utente dovrà </a:t>
             </a:r>
             <a:r>
               <a:rPr lang="it-IT" dirty="0">
@@ -8896,6 +8802,22 @@
               </a:rPr>
               <a:t>selezione degli interventi successivi al primo, ora è necessario selezionare prima la caratteristica qualitativa e successivamente la struttura ad essa associata. </a:t>
             </a:r>
+            <a:endParaRPr lang="it-IT" dirty="0" smtClean="0">
+              <a:latin typeface="Times New Roman" panose="02020603050405020304" pitchFamily="18" charset="0"/>
+              <a:cs typeface="Times New Roman" panose="02020603050405020304" pitchFamily="18" charset="0"/>
+            </a:endParaRPr>
+          </a:p>
+          <a:p>
+            <a:pPr marL="0" indent="0" algn="just">
+              <a:buNone/>
+            </a:pPr>
+            <a:r>
+              <a:rPr lang="it-IT" dirty="0">
+                <a:latin typeface="Times New Roman" panose="02020603050405020304" pitchFamily="18" charset="0"/>
+                <a:cs typeface="Times New Roman" panose="02020603050405020304" pitchFamily="18" charset="0"/>
+              </a:rPr>
+              <a:t>Nella prima scelta c’è una distinzione per indicare su quali caratteristiche l’utente deve rivolgere subito la sua attenzione (indicate in rosso) e quelle ritenute meno urgenti (indicate in verde).</a:t>
+            </a:r>
             <a:endParaRPr lang="it-IT" dirty="0">
               <a:latin typeface="Times New Roman" panose="02020603050405020304" pitchFamily="18" charset="0"/>
               <a:cs typeface="Times New Roman" panose="02020603050405020304" pitchFamily="18" charset="0"/>
@@ -8905,7 +8827,7 @@
       </p:sp>
       <p:pic>
         <p:nvPicPr>
-          <p:cNvPr id="4" name="Immagine 3"/>
+          <p:cNvPr id="5" name="Immagine 4"/>
           <p:cNvPicPr>
             <a:picLocks noChangeAspect="1"/>
           </p:cNvPicPr>
@@ -8925,8 +8847,8 @@
         </p:blipFill>
         <p:spPr>
           <a:xfrm>
-            <a:off x="5029118" y="1489021"/>
-            <a:ext cx="6388030" cy="4822223"/>
+            <a:off x="5350073" y="1489021"/>
+            <a:ext cx="6388029" cy="4822223"/>
           </a:xfrm>
           <a:prstGeom prst="rect">
             <a:avLst/>
@@ -9038,10 +8960,6 @@
               </a:rPr>
               <a:t>Quando l’utente ha raggiunto il livello inferiore di classe di vulnerabilità viene mostrato a schermo un riquadro con un messaggio di successo.</a:t>
             </a:r>
-            <a:endParaRPr lang="it-IT" dirty="0">
-              <a:latin typeface="Times New Roman" panose="02020603050405020304" pitchFamily="18" charset="0"/>
-              <a:cs typeface="Times New Roman" panose="02020603050405020304" pitchFamily="18" charset="0"/>
-            </a:endParaRPr>
           </a:p>
         </p:txBody>
       </p:sp>
@@ -9194,14 +9112,7 @@
                 <a:latin typeface="Times New Roman" panose="02020603050405020304" pitchFamily="18" charset="0"/>
                 <a:cs typeface="Times New Roman" panose="02020603050405020304" pitchFamily="18" charset="0"/>
               </a:rPr>
-              <a:t> precedenti </a:t>
-            </a:r>
-            <a:r>
-              <a:rPr lang="it-IT" dirty="0">
-                <a:latin typeface="Times New Roman" panose="02020603050405020304" pitchFamily="18" charset="0"/>
-                <a:cs typeface="Times New Roman" panose="02020603050405020304" pitchFamily="18" charset="0"/>
-              </a:rPr>
-              <a:t>e</a:t>
+              <a:t> precedenti e</a:t>
             </a:r>
             <a:r>
               <a:rPr lang="it-IT" dirty="0" smtClean="0">
@@ -9264,14 +9175,7 @@
                 <a:latin typeface="Times New Roman" panose="02020603050405020304" pitchFamily="18" charset="0"/>
                 <a:cs typeface="Times New Roman" panose="02020603050405020304" pitchFamily="18" charset="0"/>
               </a:rPr>
-              <a:t>possibile ottenere il valore della somma dei costi parziali.</a:t>
-            </a:r>
-            <a:r>
-              <a:rPr lang="it-IT" dirty="0">
-                <a:latin typeface="Times New Roman" panose="02020603050405020304" pitchFamily="18" charset="0"/>
-                <a:cs typeface="Times New Roman" panose="02020603050405020304" pitchFamily="18" charset="0"/>
-              </a:rPr>
-              <a:t> </a:t>
+              <a:t>possibile ottenere il valore della somma dei costi parziali. </a:t>
             </a:r>
           </a:p>
         </p:txBody>
@@ -10023,10 +9927,6 @@
               </a:rPr>
               <a:t>SeiApp quindi integrarla in ambiente Android e iOS.</a:t>
             </a:r>
-            <a:endParaRPr lang="it-IT" dirty="0" smtClean="0">
-              <a:latin typeface="Times New Roman" panose="02020603050405020304" pitchFamily="18" charset="0"/>
-              <a:cs typeface="Times New Roman" panose="02020603050405020304" pitchFamily="18" charset="0"/>
-            </a:endParaRPr>
           </a:p>
           <a:p>
             <a:pPr marL="0" indent="0">
@@ -11385,7 +11285,7 @@
 <file path=ppt/theme/theme1.xml><?xml version="1.0" encoding="utf-8"?>
 <a:theme xmlns:a="http://schemas.openxmlformats.org/drawingml/2006/main" name="Ione">
   <a:themeElements>
-    <a:clrScheme name="Ione">
+    <a:clrScheme name="Personalizzato 1">
       <a:dk1>
         <a:sysClr val="windowText" lastClr="000000"/>
       </a:dk1>
@@ -11393,34 +11293,34 @@
         <a:sysClr val="window" lastClr="FFFFFF"/>
       </a:lt1>
       <a:dk2>
-        <a:srgbClr val="1E5155"/>
+        <a:srgbClr val="0E5580"/>
       </a:dk2>
       <a:lt2>
         <a:srgbClr val="EBEBEB"/>
       </a:lt2>
       <a:accent1>
-        <a:srgbClr val="B01513"/>
+        <a:srgbClr val="FF0000"/>
       </a:accent1>
       <a:accent2>
-        <a:srgbClr val="EA6312"/>
+        <a:srgbClr val="E6C133"/>
       </a:accent2>
       <a:accent3>
-        <a:srgbClr val="E6B729"/>
+        <a:srgbClr val="EF7A24"/>
       </a:accent3>
       <a:accent4>
-        <a:srgbClr val="6AAC90"/>
+        <a:srgbClr val="5AA0F5"/>
       </a:accent4>
       <a:accent5>
-        <a:srgbClr val="54849A"/>
+        <a:srgbClr val="75CEEC"/>
       </a:accent5>
       <a:accent6>
-        <a:srgbClr val="9E5E9B"/>
+        <a:srgbClr val="65D6A0"/>
       </a:accent6>
       <a:hlink>
-        <a:srgbClr val="58C1BA"/>
+        <a:srgbClr val="C4E46E"/>
       </a:hlink>
       <a:folHlink>
-        <a:srgbClr val="9DFFCB"/>
+        <a:srgbClr val="BDE0FB"/>
       </a:folHlink>
     </a:clrScheme>
     <a:fontScheme name="Ione">
@@ -11596,19 +11496,18 @@
           <a:gsLst>
             <a:gs pos="0">
               <a:schemeClr val="phClr">
-                <a:tint val="97000"/>
-                <a:hueMod val="88000"/>
-                <a:satMod val="130000"/>
-                <a:lumMod val="124000"/>
+                <a:tint val="92000"/>
+                <a:hueMod val="96000"/>
+                <a:satMod val="128000"/>
+                <a:lumMod val="114000"/>
               </a:schemeClr>
             </a:gs>
             <a:gs pos="100000">
               <a:schemeClr val="phClr">
-                <a:tint val="96000"/>
-                <a:shade val="88000"/>
-                <a:hueMod val="108000"/>
-                <a:satMod val="164000"/>
-                <a:lumMod val="76000"/>
+                <a:shade val="62000"/>
+                <a:hueMod val="100000"/>
+                <a:satMod val="134000"/>
+                <a:lumMod val="56000"/>
               </a:schemeClr>
             </a:gs>
           </a:gsLst>
@@ -11620,16 +11519,16 @@
           <a:blip xmlns:r="http://schemas.openxmlformats.org/officeDocument/2006/relationships" r:embed="rId1">
             <a:duotone>
               <a:schemeClr val="phClr">
-                <a:shade val="69000"/>
+                <a:shade val="62000"/>
                 <a:hueMod val="108000"/>
                 <a:satMod val="164000"/>
-                <a:lumMod val="74000"/>
+                <a:lumMod val="69000"/>
               </a:schemeClr>
               <a:schemeClr val="phClr">
                 <a:tint val="96000"/>
-                <a:hueMod val="88000"/>
-                <a:satMod val="140000"/>
-                <a:lumMod val="132000"/>
+                <a:hueMod val="90000"/>
+                <a:satMod val="130000"/>
+                <a:lumMod val="134000"/>
               </a:schemeClr>
             </a:duotone>
           </a:blip>
@@ -11642,7 +11541,7 @@
   <a:extraClrSchemeLst/>
   <a:extLst>
     <a:ext uri="{05A4C25C-085E-4340-85A3-A5531E510DB2}">
-      <thm15:themeFamily xmlns:thm15="http://schemas.microsoft.com/office/thememl/2012/main" name="Ion" id="{B8441ADB-2E43-4AF7-B97A-BD870242C6A8}" vid="{292E63A9-BB86-4E3D-B92A-7223C6510D2E}"/>
+      <thm15:themeFamily xmlns:thm15="http://schemas.microsoft.com/office/thememl/2012/main" name="Ion" id="{B8441ADB-2E43-4AF7-B97A-BD870242C6A8}" vid="{BACC050B-8757-4460-95D8-E37B46A6B421}"/>
     </a:ext>
   </a:extLst>
 </a:theme>

</xml_diff>